<commit_message>
update day325 & day326
</commit_message>
<xml_diff>
--- a/docs/汇报ppt/中期汇报-俞颖妍.pptx
+++ b/docs/汇报ppt/中期汇报-俞颖妍.pptx
@@ -213,7 +213,7 @@
           <a:p>
             <a:fld id="{BDA51940-DB52-3B48-AABB-9C7938529E4E}" type="datetimeFigureOut">
               <a:rPr kumimoji="1" lang="zh-CN" altLang="en-US" smtClean="0"/>
-              <a:t>2025/3/23</a:t>
+              <a:t>2025/3/24</a:t>
             </a:fld>
             <a:endParaRPr kumimoji="1" lang="zh-CN" altLang="en-US"/>
           </a:p>
@@ -922,7 +922,7 @@
           <a:p>
             <a:fld id="{E4551058-E5DB-324A-A8E9-6D3BEF243C3B}" type="datetimeFigureOut">
               <a:rPr kumimoji="1" lang="zh-CN" altLang="en-US" smtClean="0"/>
-              <a:t>2025/3/23</a:t>
+              <a:t>2025/3/24</a:t>
             </a:fld>
             <a:endParaRPr kumimoji="1" lang="zh-CN" altLang="en-US"/>
           </a:p>
@@ -1204,7 +1204,7 @@
           <a:p>
             <a:fld id="{E4551058-E5DB-324A-A8E9-6D3BEF243C3B}" type="datetimeFigureOut">
               <a:rPr kumimoji="1" lang="zh-CN" altLang="en-US" smtClean="0"/>
-              <a:t>2025/3/23</a:t>
+              <a:t>2025/3/24</a:t>
             </a:fld>
             <a:endParaRPr kumimoji="1" lang="zh-CN" altLang="en-US"/>
           </a:p>
@@ -1426,7 +1426,7 @@
           <a:p>
             <a:fld id="{E4551058-E5DB-324A-A8E9-6D3BEF243C3B}" type="datetimeFigureOut">
               <a:rPr kumimoji="1" lang="zh-CN" altLang="en-US" smtClean="0"/>
-              <a:t>2025/3/23</a:t>
+              <a:t>2025/3/24</a:t>
             </a:fld>
             <a:endParaRPr kumimoji="1" lang="zh-CN" altLang="en-US"/>
           </a:p>
@@ -1700,7 +1700,7 @@
           <a:p>
             <a:fld id="{E4551058-E5DB-324A-A8E9-6D3BEF243C3B}" type="datetimeFigureOut">
               <a:rPr kumimoji="1" lang="zh-CN" altLang="en-US" smtClean="0"/>
-              <a:t>2025/3/23</a:t>
+              <a:t>2025/3/24</a:t>
             </a:fld>
             <a:endParaRPr kumimoji="1" lang="zh-CN" altLang="en-US"/>
           </a:p>
@@ -1957,7 +1957,7 @@
           <a:p>
             <a:fld id="{E4551058-E5DB-324A-A8E9-6D3BEF243C3B}" type="datetimeFigureOut">
               <a:rPr kumimoji="1" lang="zh-CN" altLang="en-US" smtClean="0"/>
-              <a:t>2025/3/23</a:t>
+              <a:t>2025/3/24</a:t>
             </a:fld>
             <a:endParaRPr kumimoji="1" lang="zh-CN" altLang="en-US"/>
           </a:p>
@@ -2156,7 +2156,7 @@
           <a:p>
             <a:fld id="{E4551058-E5DB-324A-A8E9-6D3BEF243C3B}" type="datetimeFigureOut">
               <a:rPr kumimoji="1" lang="zh-CN" altLang="en-US" smtClean="0"/>
-              <a:t>2025/3/23</a:t>
+              <a:t>2025/3/24</a:t>
             </a:fld>
             <a:endParaRPr kumimoji="1" lang="zh-CN" altLang="en-US"/>
           </a:p>
@@ -2729,7 +2729,7 @@
           <a:p>
             <a:fld id="{E4551058-E5DB-324A-A8E9-6D3BEF243C3B}" type="datetimeFigureOut">
               <a:rPr kumimoji="1" lang="zh-CN" altLang="en-US" smtClean="0"/>
-              <a:t>2025/3/23</a:t>
+              <a:t>2025/3/24</a:t>
             </a:fld>
             <a:endParaRPr kumimoji="1" lang="zh-CN" altLang="en-US"/>
           </a:p>
@@ -3023,7 +3023,7 @@
           <a:p>
             <a:fld id="{E4551058-E5DB-324A-A8E9-6D3BEF243C3B}" type="datetimeFigureOut">
               <a:rPr kumimoji="1" lang="zh-CN" altLang="en-US" smtClean="0"/>
-              <a:t>2025/3/23</a:t>
+              <a:t>2025/3/24</a:t>
             </a:fld>
             <a:endParaRPr kumimoji="1" lang="zh-CN" altLang="en-US"/>
           </a:p>
@@ -3406,7 +3406,7 @@
           <a:p>
             <a:fld id="{E4551058-E5DB-324A-A8E9-6D3BEF243C3B}" type="datetimeFigureOut">
               <a:rPr kumimoji="1" lang="zh-CN" altLang="en-US" smtClean="0"/>
-              <a:t>2025/3/23</a:t>
+              <a:t>2025/3/24</a:t>
             </a:fld>
             <a:endParaRPr kumimoji="1" lang="zh-CN" altLang="en-US"/>
           </a:p>
@@ -3529,7 +3529,7 @@
           <a:p>
             <a:fld id="{E4551058-E5DB-324A-A8E9-6D3BEF243C3B}" type="datetimeFigureOut">
               <a:rPr kumimoji="1" lang="zh-CN" altLang="en-US" smtClean="0"/>
-              <a:t>2025/3/23</a:t>
+              <a:t>2025/3/24</a:t>
             </a:fld>
             <a:endParaRPr kumimoji="1" lang="zh-CN" altLang="en-US"/>
           </a:p>
@@ -3652,7 +3652,7 @@
           <a:p>
             <a:fld id="{E4551058-E5DB-324A-A8E9-6D3BEF243C3B}" type="datetimeFigureOut">
               <a:rPr kumimoji="1" lang="zh-CN" altLang="en-US" smtClean="0"/>
-              <a:t>2025/3/23</a:t>
+              <a:t>2025/3/24</a:t>
             </a:fld>
             <a:endParaRPr kumimoji="1" lang="zh-CN" altLang="en-US"/>
           </a:p>
@@ -4102,7 +4102,7 @@
           <a:p>
             <a:fld id="{E4551058-E5DB-324A-A8E9-6D3BEF243C3B}" type="datetimeFigureOut">
               <a:rPr kumimoji="1" lang="zh-CN" altLang="en-US" smtClean="0"/>
-              <a:t>2025/3/23</a:t>
+              <a:t>2025/3/24</a:t>
             </a:fld>
             <a:endParaRPr kumimoji="1" lang="zh-CN" altLang="en-US"/>
           </a:p>
@@ -4409,7 +4409,7 @@
           <a:p>
             <a:fld id="{E4551058-E5DB-324A-A8E9-6D3BEF243C3B}" type="datetimeFigureOut">
               <a:rPr kumimoji="1" lang="zh-CN" altLang="en-US" smtClean="0"/>
-              <a:t>2025/3/23</a:t>
+              <a:t>2025/3/24</a:t>
             </a:fld>
             <a:endParaRPr kumimoji="1" lang="zh-CN" altLang="en-US"/>
           </a:p>
@@ -5110,7 +5110,7 @@
           <a:p>
             <a:r>
               <a:rPr kumimoji="1" lang="zh-CN" altLang="en-US" dirty="0"/>
-              <a:t>指导教师：戴桂兰  陈渝</a:t>
+              <a:t>指导教师：戴桂兰 </a:t>
             </a:r>
           </a:p>
         </p:txBody>
@@ -5163,7 +5163,7 @@
         </p:nvSpPr>
         <p:spPr>
           <a:xfrm>
-            <a:off x="833378" y="2180498"/>
+            <a:off x="833378" y="1882787"/>
             <a:ext cx="8587069" cy="4084078"/>
           </a:xfrm>
         </p:spPr>
@@ -5194,7 +5194,7 @@
               <a:t>积累毕设素材</a:t>
             </a:r>
             <a:r>
-              <a:rPr kumimoji="1" lang="en-US" altLang="zh-CN" sz="1800" dirty="0"/>
+              <a:rPr kumimoji="1" lang="en-US" altLang="zh-CN" sz="1800" b="1" dirty="0"/>
               <a:t>10000+</a:t>
             </a:r>
             <a:r>
@@ -5202,7 +5202,7 @@
               <a:t>字、</a:t>
             </a:r>
             <a:r>
-              <a:rPr kumimoji="1" lang="en-US" altLang="zh-CN" sz="1800" dirty="0"/>
+              <a:rPr kumimoji="1" lang="en-US" altLang="zh-CN" sz="1800" b="1" dirty="0"/>
               <a:t>40+</a:t>
             </a:r>
             <a:r>
@@ -5225,7 +5225,23 @@
           <a:p>
             <a:r>
               <a:rPr kumimoji="1" lang="zh-CN" altLang="en-US" sz="2000" dirty="0"/>
-              <a:t>撰写</a:t>
+              <a:t>撰写 </a:t>
+            </a:r>
+            <a:r>
+              <a:rPr kumimoji="1" lang="en-US" altLang="zh-CN" sz="2000" dirty="0"/>
+              <a:t>Starry-</a:t>
+            </a:r>
+            <a:r>
+              <a:rPr kumimoji="1" lang="en-US" altLang="zh-CN" sz="2000" dirty="0" err="1"/>
+              <a:t>Toturial</a:t>
+            </a:r>
+            <a:r>
+              <a:rPr kumimoji="1" lang="en-US" altLang="zh-CN" sz="2000" dirty="0"/>
+              <a:t>-Book</a:t>
+            </a:r>
+            <a:r>
+              <a:rPr kumimoji="1" lang="zh-CN" altLang="en-US" sz="2000" dirty="0"/>
+              <a:t>的</a:t>
             </a:r>
             <a:r>
               <a:rPr kumimoji="1" lang="en-US" altLang="zh-CN" sz="2000" dirty="0" err="1"/>
@@ -5341,8 +5357,8 @@
         </p:blipFill>
         <p:spPr>
           <a:xfrm>
-            <a:off x="7315201" y="3433006"/>
-            <a:ext cx="2075114" cy="3284609"/>
+            <a:off x="7396637" y="3561907"/>
+            <a:ext cx="1993678" cy="3155708"/>
           </a:xfrm>
           <a:prstGeom prst="rect">
             <a:avLst/>
@@ -5363,7 +5379,7 @@
         </p:nvGrpSpPr>
         <p:grpSpPr>
           <a:xfrm>
-            <a:off x="2541069" y="4315681"/>
+            <a:off x="2594234" y="4315681"/>
             <a:ext cx="4774131" cy="2250921"/>
             <a:chOff x="2541069" y="4315681"/>
             <a:chExt cx="4774131" cy="2250921"/>
@@ -7349,7 +7365,7 @@
         </p:spPr>
         <p:txBody>
           <a:bodyPr>
-            <a:normAutofit/>
+            <a:normAutofit lnSpcReduction="10000"/>
           </a:bodyPr>
           <a:lstStyle/>
           <a:p>
@@ -7385,58 +7401,58 @@
           <a:p>
             <a:pPr lvl="2"/>
             <a:r>
-              <a:rPr kumimoji="1" lang="zh-CN" altLang="en-US" sz="1700" dirty="0"/>
+              <a:rPr kumimoji="1" lang="zh-CN" altLang="en-US" sz="1800" dirty="0"/>
               <a:t>基础系统调用（</a:t>
             </a:r>
             <a:r>
-              <a:rPr kumimoji="1" lang="en-US" altLang="zh-CN" sz="1700" dirty="0"/>
+              <a:rPr kumimoji="1" lang="en-US" altLang="zh-CN" sz="1800" dirty="0"/>
               <a:t>GETPID</a:t>
             </a:r>
             <a:r>
-              <a:rPr kumimoji="1" lang="zh-CN" altLang="en-US" sz="1700" dirty="0"/>
+              <a:rPr kumimoji="1" lang="zh-CN" altLang="en-US" sz="1800" dirty="0"/>
               <a:t>、</a:t>
             </a:r>
             <a:r>
-              <a:rPr kumimoji="1" lang="en-US" altLang="zh-CN" sz="1700" dirty="0"/>
+              <a:rPr kumimoji="1" lang="en-US" altLang="zh-CN" sz="1800" dirty="0"/>
               <a:t>GETPPID </a:t>
             </a:r>
             <a:r>
-              <a:rPr kumimoji="1" lang="zh-CN" altLang="en-US" sz="1700" dirty="0"/>
+              <a:rPr kumimoji="1" lang="zh-CN" altLang="en-US" sz="1800" dirty="0"/>
               <a:t>、</a:t>
             </a:r>
             <a:r>
-              <a:rPr kumimoji="1" lang="en-US" altLang="zh-CN" sz="1700" dirty="0"/>
+              <a:rPr kumimoji="1" lang="en-US" altLang="zh-CN" sz="1800" dirty="0"/>
               <a:t>EXIT</a:t>
             </a:r>
             <a:r>
-              <a:rPr kumimoji="1" lang="zh-CN" altLang="en-US" sz="1700" dirty="0"/>
+              <a:rPr kumimoji="1" lang="zh-CN" altLang="en-US" sz="1800" dirty="0"/>
               <a:t>等）</a:t>
             </a:r>
-            <a:endParaRPr kumimoji="1" lang="en-US" altLang="zh-CN" sz="1700" dirty="0"/>
+            <a:endParaRPr kumimoji="1" lang="en-US" altLang="zh-CN" sz="1800" dirty="0"/>
           </a:p>
           <a:p>
             <a:pPr lvl="2"/>
             <a:r>
-              <a:rPr kumimoji="1" lang="zh-CN" altLang="en-US" sz="1700" dirty="0"/>
+              <a:rPr kumimoji="1" lang="zh-CN" altLang="en-US" sz="1800" dirty="0"/>
               <a:t>时间相关系统调用（</a:t>
             </a:r>
             <a:r>
-              <a:rPr kumimoji="1" lang="en-US" altLang="zh-CN" sz="1700" dirty="0"/>
+              <a:rPr kumimoji="1" lang="en-US" altLang="zh-CN" sz="1800" dirty="0"/>
               <a:t>GETTIMEOFDAY</a:t>
             </a:r>
             <a:r>
-              <a:rPr kumimoji="1" lang="zh-CN" altLang="en-US" sz="1700" dirty="0"/>
+              <a:rPr kumimoji="1" lang="zh-CN" altLang="en-US" sz="1800" dirty="0"/>
               <a:t>、</a:t>
             </a:r>
             <a:r>
-              <a:rPr kumimoji="1" lang="en-US" altLang="zh-CN" sz="1700" dirty="0"/>
+              <a:rPr kumimoji="1" lang="en-US" altLang="zh-CN" sz="1800" dirty="0"/>
               <a:t>NANO_SLEEP </a:t>
             </a:r>
             <a:r>
-              <a:rPr kumimoji="1" lang="zh-CN" altLang="en-US" sz="1700" dirty="0"/>
+              <a:rPr kumimoji="1" lang="zh-CN" altLang="en-US" sz="1800" dirty="0"/>
               <a:t>等）</a:t>
             </a:r>
-            <a:endParaRPr kumimoji="1" lang="en-US" altLang="zh-CN" sz="1700" dirty="0"/>
+            <a:endParaRPr kumimoji="1" lang="en-US" altLang="zh-CN" sz="1800" dirty="0"/>
           </a:p>
           <a:p>
             <a:pPr lvl="2"/>
@@ -7514,6 +7530,30 @@
             <a:r>
               <a:rPr kumimoji="1" lang="zh-CN" altLang="en-US" sz="1800" dirty="0"/>
               <a:t>四个架构上运行并通过基础测试</a:t>
+            </a:r>
+            <a:endParaRPr kumimoji="1" lang="en-US" altLang="zh-CN" sz="1800" dirty="0"/>
+          </a:p>
+          <a:p>
+            <a:pPr lvl="1"/>
+            <a:r>
+              <a:rPr kumimoji="1" lang="en-US" altLang="zh-CN" sz="1800" dirty="0"/>
+              <a:t>commit</a:t>
+            </a:r>
+            <a:r>
+              <a:rPr kumimoji="1" lang="en-US" altLang="zh-CN" sz="1800" b="1" dirty="0"/>
+              <a:t>15+</a:t>
+            </a:r>
+            <a:r>
+              <a:rPr kumimoji="1" lang="zh-CN" altLang="en-US" sz="1800" dirty="0"/>
+              <a:t>次 代码修改与添加</a:t>
+            </a:r>
+            <a:r>
+              <a:rPr kumimoji="1" lang="en-US" altLang="zh-CN" sz="1800" b="1" dirty="0"/>
+              <a:t>100+</a:t>
+            </a:r>
+            <a:r>
+              <a:rPr kumimoji="1" lang="zh-CN" altLang="en-US" sz="1800" dirty="0"/>
+              <a:t>行</a:t>
             </a:r>
           </a:p>
         </p:txBody>

</xml_diff>